<commit_message>
pictures for helps added
</commit_message>
<xml_diff>
--- a/Dokumentáció/NONOGRAM.pptx
+++ b/Dokumentáció/NONOGRAM.pptx
@@ -10,27 +10,28 @@
     <p:sldId id="257" r:id="rId4"/>
     <p:sldId id="260" r:id="rId5"/>
     <p:sldId id="261" r:id="rId6"/>
-    <p:sldId id="262" r:id="rId7"/>
+    <p:sldId id="263" r:id="rId7"/>
+    <p:sldId id="262" r:id="rId8"/>
   </p:sldIdLst>
   <p:sldSz cx="12192000" cy="6858000"/>
   <p:notesSz cx="6858000" cy="9144000"/>
   <p:embeddedFontLst>
     <p:embeddedFont>
       <p:font typeface="Ed Interlock" panose="02000000000000000000" pitchFamily="50" charset="0"/>
-      <p:regular r:id="rId8"/>
+      <p:regular r:id="rId9"/>
     </p:embeddedFont>
     <p:embeddedFont>
       <p:font typeface="Grandview" panose="020B0502040204020203" pitchFamily="34" charset="0"/>
-      <p:regular r:id="rId9"/>
-      <p:bold r:id="rId10"/>
+      <p:regular r:id="rId10"/>
+      <p:bold r:id="rId11"/>
     </p:embeddedFont>
     <p:embeddedFont>
       <p:font typeface="Grandview Display" panose="020B0502040204020203" pitchFamily="34" charset="0"/>
-      <p:regular r:id="rId11"/>
+      <p:regular r:id="rId12"/>
     </p:embeddedFont>
     <p:embeddedFont>
       <p:font typeface="Webdings" panose="05030102010509060703" pitchFamily="18" charset="2"/>
-      <p:regular r:id="rId12"/>
+      <p:regular r:id="rId13"/>
     </p:embeddedFont>
   </p:embeddedFontLst>
   <p:defaultTextStyle>
@@ -128,6 +129,11 @@
       </a:defRPr>
     </a:lvl9pPr>
   </p:defaultTextStyle>
+  <p:extLst>
+    <p:ext uri="{EFAFB233-063F-42B5-8137-9DF3F51BA10A}">
+      <p15:sldGuideLst xmlns:p15="http://schemas.microsoft.com/office/powerpoint/2012/main"/>
+    </p:ext>
+  </p:extLst>
 </p:presentation>
 </file>
 
@@ -287,7 +293,7 @@
           <a:p>
             <a:fld id="{D341B595-366B-43E2-A22E-EA6A78C03F06}" type="datetimeFigureOut">
               <a:rPr lang="en-US" smtClean="0"/>
-              <a:t>9/29/2024</a:t>
+              <a:t>11/29/2024</a:t>
             </a:fld>
             <a:endParaRPr lang="en-US"/>
           </a:p>
@@ -485,7 +491,7 @@
           <a:p>
             <a:fld id="{D341B595-366B-43E2-A22E-EA6A78C03F06}" type="datetimeFigureOut">
               <a:rPr lang="en-US" smtClean="0"/>
-              <a:t>9/29/2024</a:t>
+              <a:t>11/29/2024</a:t>
             </a:fld>
             <a:endParaRPr lang="en-US"/>
           </a:p>
@@ -694,7 +700,7 @@
           <a:p>
             <a:fld id="{D341B595-366B-43E2-A22E-EA6A78C03F06}" type="datetimeFigureOut">
               <a:rPr lang="en-US" smtClean="0"/>
-              <a:t>9/29/2024</a:t>
+              <a:t>11/29/2024</a:t>
             </a:fld>
             <a:endParaRPr lang="en-US"/>
           </a:p>
@@ -892,7 +898,7 @@
           <a:p>
             <a:fld id="{D341B595-366B-43E2-A22E-EA6A78C03F06}" type="datetimeFigureOut">
               <a:rPr lang="en-US" smtClean="0"/>
-              <a:t>9/29/2024</a:t>
+              <a:t>11/29/2024</a:t>
             </a:fld>
             <a:endParaRPr lang="en-US"/>
           </a:p>
@@ -1170,7 +1176,7 @@
           <a:p>
             <a:fld id="{D341B595-366B-43E2-A22E-EA6A78C03F06}" type="datetimeFigureOut">
               <a:rPr lang="en-US" smtClean="0"/>
-              <a:t>9/29/2024</a:t>
+              <a:t>11/29/2024</a:t>
             </a:fld>
             <a:endParaRPr lang="en-US"/>
           </a:p>
@@ -1438,7 +1444,7 @@
           <a:p>
             <a:fld id="{D341B595-366B-43E2-A22E-EA6A78C03F06}" type="datetimeFigureOut">
               <a:rPr lang="en-US" smtClean="0"/>
-              <a:t>9/29/2024</a:t>
+              <a:t>11/29/2024</a:t>
             </a:fld>
             <a:endParaRPr lang="en-US"/>
           </a:p>
@@ -1857,7 +1863,7 @@
           <a:p>
             <a:fld id="{D341B595-366B-43E2-A22E-EA6A78C03F06}" type="datetimeFigureOut">
               <a:rPr lang="en-US" smtClean="0"/>
-              <a:t>9/29/2024</a:t>
+              <a:t>11/29/2024</a:t>
             </a:fld>
             <a:endParaRPr lang="en-US"/>
           </a:p>
@@ -1998,7 +2004,7 @@
           <a:p>
             <a:fld id="{D341B595-366B-43E2-A22E-EA6A78C03F06}" type="datetimeFigureOut">
               <a:rPr lang="en-US" smtClean="0"/>
-              <a:t>9/29/2024</a:t>
+              <a:t>11/29/2024</a:t>
             </a:fld>
             <a:endParaRPr lang="en-US"/>
           </a:p>
@@ -2111,7 +2117,7 @@
           <a:p>
             <a:fld id="{D341B595-366B-43E2-A22E-EA6A78C03F06}" type="datetimeFigureOut">
               <a:rPr lang="en-US" smtClean="0"/>
-              <a:t>9/29/2024</a:t>
+              <a:t>11/29/2024</a:t>
             </a:fld>
             <a:endParaRPr lang="en-US"/>
           </a:p>
@@ -2426,7 +2432,7 @@
           <a:p>
             <a:fld id="{D341B595-366B-43E2-A22E-EA6A78C03F06}" type="datetimeFigureOut">
               <a:rPr lang="en-US" smtClean="0"/>
-              <a:t>9/29/2024</a:t>
+              <a:t>11/29/2024</a:t>
             </a:fld>
             <a:endParaRPr lang="en-US"/>
           </a:p>
@@ -2720,7 +2726,7 @@
           <a:p>
             <a:fld id="{D341B595-366B-43E2-A22E-EA6A78C03F06}" type="datetimeFigureOut">
               <a:rPr lang="en-US" smtClean="0"/>
-              <a:t>9/29/2024</a:t>
+              <a:t>11/29/2024</a:t>
             </a:fld>
             <a:endParaRPr lang="en-US"/>
           </a:p>
@@ -2960,7 +2966,7 @@
           <a:p>
             <a:fld id="{D341B595-366B-43E2-A22E-EA6A78C03F06}" type="datetimeFigureOut">
               <a:rPr lang="en-US" smtClean="0"/>
-              <a:t>9/29/2024</a:t>
+              <a:t>11/29/2024</a:t>
             </a:fld>
             <a:endParaRPr lang="en-US"/>
           </a:p>
@@ -4047,13 +4053,13 @@
   <p:clrMapOvr>
     <a:masterClrMapping/>
   </p:clrMapOvr>
-  <mc:AlternateContent xmlns:mc="http://schemas.openxmlformats.org/markup-compatibility/2006">
-    <mc:Choice xmlns:p14="http://schemas.microsoft.com/office/powerpoint/2010/main" Requires="p14">
+  <mc:AlternateContent xmlns:mc="http://schemas.openxmlformats.org/markup-compatibility/2006" xmlns:p14="http://schemas.microsoft.com/office/powerpoint/2010/main">
+    <mc:Choice Requires="p14">
       <p:transition spd="slow" p14:dur="900">
         <p14:warp dir="in"/>
       </p:transition>
     </mc:Choice>
-    <mc:Fallback>
+    <mc:Fallback xmlns="">
       <p:transition spd="slow">
         <p:fade/>
       </p:transition>
@@ -6686,13 +6692,13 @@
   <p:clrMapOvr>
     <a:masterClrMapping/>
   </p:clrMapOvr>
-  <mc:AlternateContent xmlns:mc="http://schemas.openxmlformats.org/markup-compatibility/2006">
-    <mc:Choice xmlns:p14="http://schemas.microsoft.com/office/powerpoint/2010/main" Requires="p14">
+  <mc:AlternateContent xmlns:mc="http://schemas.openxmlformats.org/markup-compatibility/2006" xmlns:p14="http://schemas.microsoft.com/office/powerpoint/2010/main">
+    <mc:Choice Requires="p14">
       <p:transition spd="slow" p14:dur="900">
         <p14:warp dir="in"/>
       </p:transition>
     </mc:Choice>
-    <mc:Fallback>
+    <mc:Fallback xmlns="">
       <p:transition spd="slow">
         <p:fade/>
       </p:transition>
@@ -9094,13 +9100,13 @@
   <p:clrMapOvr>
     <a:masterClrMapping/>
   </p:clrMapOvr>
-  <mc:AlternateContent xmlns:mc="http://schemas.openxmlformats.org/markup-compatibility/2006">
-    <mc:Choice xmlns:p14="http://schemas.microsoft.com/office/powerpoint/2010/main" Requires="p14">
+  <mc:AlternateContent xmlns:mc="http://schemas.openxmlformats.org/markup-compatibility/2006" xmlns:p14="http://schemas.microsoft.com/office/powerpoint/2010/main">
+    <mc:Choice Requires="p14">
       <p:transition spd="slow" p14:dur="900">
         <p14:warp dir="in"/>
       </p:transition>
     </mc:Choice>
-    <mc:Fallback>
+    <mc:Fallback xmlns="">
       <p:transition spd="slow">
         <p:fade/>
       </p:transition>
@@ -9110,6 +9116,675 @@
 </file>
 
 <file path=ppt/slides/slide6.xml><?xml version="1.0" encoding="utf-8"?>
+<p:sld xmlns:a="http://schemas.openxmlformats.org/drawingml/2006/main" xmlns:r="http://schemas.openxmlformats.org/officeDocument/2006/relationships" xmlns:p="http://schemas.openxmlformats.org/presentationml/2006/main">
+  <p:cSld>
+    <p:spTree>
+      <p:nvGrpSpPr>
+        <p:cNvPr id="1" name=""/>
+        <p:cNvGrpSpPr/>
+        <p:nvPr/>
+      </p:nvGrpSpPr>
+      <p:grpSpPr>
+        <a:xfrm>
+          <a:off x="0" y="0"/>
+          <a:ext cx="0" cy="0"/>
+          <a:chOff x="0" y="0"/>
+          <a:chExt cx="0" cy="0"/>
+        </a:xfrm>
+      </p:grpSpPr>
+      <p:sp>
+        <p:nvSpPr>
+          <p:cNvPr id="2" name="Cím 1">
+            <a:extLst>
+              <a:ext uri="{FF2B5EF4-FFF2-40B4-BE49-F238E27FC236}">
+                <a16:creationId xmlns:a16="http://schemas.microsoft.com/office/drawing/2014/main" id="{81111E4C-EE0A-23AC-53DC-53021233E1F9}"/>
+              </a:ext>
+            </a:extLst>
+          </p:cNvPr>
+          <p:cNvSpPr>
+            <a:spLocks noGrp="1"/>
+          </p:cNvSpPr>
+          <p:nvPr>
+            <p:ph type="title"/>
+          </p:nvPr>
+        </p:nvSpPr>
+        <p:spPr/>
+        <p:txBody>
+          <a:bodyPr/>
+          <a:lstStyle/>
+          <a:p>
+            <a:endParaRPr lang="hu-HU" dirty="0"/>
+          </a:p>
+        </p:txBody>
+      </p:sp>
+      <p:pic>
+        <p:nvPicPr>
+          <p:cNvPr id="4" name="Tartalom helye 3" descr="Szem egyszínű kitöltéssel">
+            <a:extLst>
+              <a:ext uri="{FF2B5EF4-FFF2-40B4-BE49-F238E27FC236}">
+                <a16:creationId xmlns:a16="http://schemas.microsoft.com/office/drawing/2014/main" id="{EB3DF582-FA3E-123B-6C3C-69B79061140A}"/>
+              </a:ext>
+            </a:extLst>
+          </p:cNvPr>
+          <p:cNvPicPr>
+            <a:picLocks noGrp="1" noChangeAspect="1"/>
+          </p:cNvPicPr>
+          <p:nvPr>
+            <p:ph idx="1"/>
+          </p:nvPr>
+        </p:nvPicPr>
+        <p:blipFill>
+          <a:blip r:embed="rId2">
+            <a:extLst>
+              <a:ext uri="{96DAC541-7B7A-43D3-8B79-37D633B846F1}">
+                <asvg:svgBlip xmlns:asvg="http://schemas.microsoft.com/office/drawing/2016/SVG/main" r:embed="rId3"/>
+              </a:ext>
+            </a:extLst>
+          </a:blip>
+          <a:stretch>
+            <a:fillRect/>
+          </a:stretch>
+        </p:blipFill>
+        <p:spPr>
+          <a:xfrm>
+            <a:off x="809625" y="1943100"/>
+            <a:ext cx="914400" cy="914400"/>
+          </a:xfrm>
+          <a:prstGeom prst="rect">
+            <a:avLst/>
+          </a:prstGeom>
+        </p:spPr>
+      </p:pic>
+      <p:pic>
+        <p:nvPicPr>
+          <p:cNvPr id="5" name="Tartalom helye 3" descr="Szem egyszínű kitöltéssel">
+            <a:extLst>
+              <a:ext uri="{FF2B5EF4-FFF2-40B4-BE49-F238E27FC236}">
+                <a16:creationId xmlns:a16="http://schemas.microsoft.com/office/drawing/2014/main" id="{26E4A265-6F45-E2C5-F7AD-96EEA05506EE}"/>
+              </a:ext>
+            </a:extLst>
+          </p:cNvPr>
+          <p:cNvPicPr>
+            <a:picLocks noChangeAspect="1"/>
+          </p:cNvPicPr>
+          <p:nvPr/>
+        </p:nvPicPr>
+        <p:blipFill>
+          <a:blip r:embed="rId4">
+            <a:extLst>
+              <a:ext uri="{96DAC541-7B7A-43D3-8B79-37D633B846F1}">
+                <asvg:svgBlip xmlns:asvg="http://schemas.microsoft.com/office/drawing/2016/SVG/main" r:embed="rId5"/>
+              </a:ext>
+            </a:extLst>
+          </a:blip>
+          <a:stretch>
+            <a:fillRect/>
+          </a:stretch>
+        </p:blipFill>
+        <p:spPr>
+          <a:xfrm>
+            <a:off x="1724025" y="1943100"/>
+            <a:ext cx="914400" cy="914400"/>
+          </a:xfrm>
+          <a:prstGeom prst="rect">
+            <a:avLst/>
+          </a:prstGeom>
+        </p:spPr>
+      </p:pic>
+      <p:pic>
+        <p:nvPicPr>
+          <p:cNvPr id="11" name="Tartalom helye 3" descr="Szem egyszínű kitöltéssel">
+            <a:extLst>
+              <a:ext uri="{FF2B5EF4-FFF2-40B4-BE49-F238E27FC236}">
+                <a16:creationId xmlns:a16="http://schemas.microsoft.com/office/drawing/2014/main" id="{21EE4CF8-D290-371F-0D29-E7A592428C5A}"/>
+              </a:ext>
+            </a:extLst>
+          </p:cNvPr>
+          <p:cNvPicPr>
+            <a:picLocks noChangeAspect="1"/>
+          </p:cNvPicPr>
+          <p:nvPr/>
+        </p:nvPicPr>
+        <p:blipFill>
+          <a:blip r:embed="rId6">
+            <a:extLst>
+              <a:ext uri="{96DAC541-7B7A-43D3-8B79-37D633B846F1}">
+                <asvg:svgBlip xmlns:asvg="http://schemas.microsoft.com/office/drawing/2016/SVG/main" r:embed="rId7"/>
+              </a:ext>
+            </a:extLst>
+          </a:blip>
+          <a:stretch>
+            <a:fillRect/>
+          </a:stretch>
+        </p:blipFill>
+        <p:spPr>
+          <a:xfrm>
+            <a:off x="1763752" y="1943100"/>
+            <a:ext cx="914400" cy="914400"/>
+          </a:xfrm>
+          <a:prstGeom prst="rect">
+            <a:avLst/>
+          </a:prstGeom>
+        </p:spPr>
+      </p:pic>
+      <p:pic>
+        <p:nvPicPr>
+          <p:cNvPr id="12" name="Ábra 11" descr="Kirakós játék egyszínű kitöltéssel">
+            <a:extLst>
+              <a:ext uri="{FF2B5EF4-FFF2-40B4-BE49-F238E27FC236}">
+                <a16:creationId xmlns:a16="http://schemas.microsoft.com/office/drawing/2014/main" id="{77470AD8-A527-8E18-7240-0917061D13F3}"/>
+              </a:ext>
+            </a:extLst>
+          </p:cNvPr>
+          <p:cNvPicPr>
+            <a:picLocks noChangeAspect="1"/>
+          </p:cNvPicPr>
+          <p:nvPr/>
+        </p:nvPicPr>
+        <p:blipFill>
+          <a:blip r:embed="rId8">
+            <a:extLst>
+              <a:ext uri="{96DAC541-7B7A-43D3-8B79-37D633B846F1}">
+                <asvg:svgBlip xmlns:asvg="http://schemas.microsoft.com/office/drawing/2016/SVG/main" r:embed="rId9"/>
+              </a:ext>
+            </a:extLst>
+          </a:blip>
+          <a:stretch>
+            <a:fillRect/>
+          </a:stretch>
+        </p:blipFill>
+        <p:spPr>
+          <a:xfrm>
+            <a:off x="3632278" y="1943100"/>
+            <a:ext cx="914399" cy="914399"/>
+          </a:xfrm>
+          <a:prstGeom prst="rect">
+            <a:avLst/>
+          </a:prstGeom>
+        </p:spPr>
+      </p:pic>
+      <p:pic>
+        <p:nvPicPr>
+          <p:cNvPr id="13" name="Ábra 12" descr="Kirakós játék egyszínű kitöltéssel">
+            <a:extLst>
+              <a:ext uri="{FF2B5EF4-FFF2-40B4-BE49-F238E27FC236}">
+                <a16:creationId xmlns:a16="http://schemas.microsoft.com/office/drawing/2014/main" id="{363386FC-400C-4789-2AA2-3A5B043F7917}"/>
+              </a:ext>
+            </a:extLst>
+          </p:cNvPr>
+          <p:cNvPicPr>
+            <a:picLocks noChangeAspect="1"/>
+          </p:cNvPicPr>
+          <p:nvPr/>
+        </p:nvPicPr>
+        <p:blipFill>
+          <a:blip r:embed="rId10">
+            <a:extLst>
+              <a:ext uri="{96DAC541-7B7A-43D3-8B79-37D633B846F1}">
+                <asvg:svgBlip xmlns:asvg="http://schemas.microsoft.com/office/drawing/2016/SVG/main" r:embed="rId11"/>
+              </a:ext>
+            </a:extLst>
+          </a:blip>
+          <a:stretch>
+            <a:fillRect/>
+          </a:stretch>
+        </p:blipFill>
+        <p:spPr>
+          <a:xfrm>
+            <a:off x="2678152" y="1943101"/>
+            <a:ext cx="914399" cy="914399"/>
+          </a:xfrm>
+          <a:prstGeom prst="rect">
+            <a:avLst/>
+          </a:prstGeom>
+        </p:spPr>
+      </p:pic>
+      <p:pic>
+        <p:nvPicPr>
+          <p:cNvPr id="14" name="Ábra 13" descr="Új egyszínű kitöltéssel">
+            <a:extLst>
+              <a:ext uri="{FF2B5EF4-FFF2-40B4-BE49-F238E27FC236}">
+                <a16:creationId xmlns:a16="http://schemas.microsoft.com/office/drawing/2014/main" id="{4594C0A5-A29D-9396-94B5-247BFBBCD2B6}"/>
+              </a:ext>
+            </a:extLst>
+          </p:cNvPr>
+          <p:cNvPicPr>
+            <a:picLocks noChangeAspect="1"/>
+          </p:cNvPicPr>
+          <p:nvPr/>
+        </p:nvPicPr>
+        <p:blipFill>
+          <a:blip r:embed="rId12">
+            <a:extLst>
+              <a:ext uri="{96DAC541-7B7A-43D3-8B79-37D633B846F1}">
+                <asvg:svgBlip xmlns:asvg="http://schemas.microsoft.com/office/drawing/2016/SVG/main" r:embed="rId13"/>
+              </a:ext>
+            </a:extLst>
+          </a:blip>
+          <a:stretch>
+            <a:fillRect/>
+          </a:stretch>
+        </p:blipFill>
+        <p:spPr>
+          <a:xfrm>
+            <a:off x="5540530" y="1943099"/>
+            <a:ext cx="914399" cy="914399"/>
+          </a:xfrm>
+          <a:prstGeom prst="rect">
+            <a:avLst/>
+          </a:prstGeom>
+        </p:spPr>
+      </p:pic>
+      <p:pic>
+        <p:nvPicPr>
+          <p:cNvPr id="15" name="Ábra 14" descr="Új egyszínű kitöltéssel">
+            <a:extLst>
+              <a:ext uri="{FF2B5EF4-FFF2-40B4-BE49-F238E27FC236}">
+                <a16:creationId xmlns:a16="http://schemas.microsoft.com/office/drawing/2014/main" id="{B0DA6F06-8926-5E85-5CC4-F613AB4DE53E}"/>
+              </a:ext>
+            </a:extLst>
+          </p:cNvPr>
+          <p:cNvPicPr>
+            <a:picLocks noChangeAspect="1"/>
+          </p:cNvPicPr>
+          <p:nvPr/>
+        </p:nvPicPr>
+        <p:blipFill>
+          <a:blip r:embed="rId14">
+            <a:extLst>
+              <a:ext uri="{96DAC541-7B7A-43D3-8B79-37D633B846F1}">
+                <asvg:svgBlip xmlns:asvg="http://schemas.microsoft.com/office/drawing/2016/SVG/main" r:embed="rId15"/>
+              </a:ext>
+            </a:extLst>
+          </a:blip>
+          <a:stretch>
+            <a:fillRect/>
+          </a:stretch>
+        </p:blipFill>
+        <p:spPr>
+          <a:xfrm>
+            <a:off x="4586404" y="1943099"/>
+            <a:ext cx="914399" cy="914399"/>
+          </a:xfrm>
+          <a:prstGeom prst="rect">
+            <a:avLst/>
+          </a:prstGeom>
+        </p:spPr>
+      </p:pic>
+      <p:pic>
+        <p:nvPicPr>
+          <p:cNvPr id="16" name="Ábra 15" descr="Radír egyszínű kitöltéssel">
+            <a:extLst>
+              <a:ext uri="{FF2B5EF4-FFF2-40B4-BE49-F238E27FC236}">
+                <a16:creationId xmlns:a16="http://schemas.microsoft.com/office/drawing/2014/main" id="{D7E392C9-67D7-15F5-DE8E-D5F6D7D96FE5}"/>
+              </a:ext>
+            </a:extLst>
+          </p:cNvPr>
+          <p:cNvPicPr>
+            <a:picLocks noChangeAspect="1"/>
+          </p:cNvPicPr>
+          <p:nvPr/>
+        </p:nvPicPr>
+        <p:blipFill>
+          <a:blip r:embed="rId16">
+            <a:extLst>
+              <a:ext uri="{96DAC541-7B7A-43D3-8B79-37D633B846F1}">
+                <asvg:svgBlip xmlns:asvg="http://schemas.microsoft.com/office/drawing/2016/SVG/main" r:embed="rId17"/>
+              </a:ext>
+            </a:extLst>
+          </a:blip>
+          <a:stretch>
+            <a:fillRect/>
+          </a:stretch>
+        </p:blipFill>
+        <p:spPr>
+          <a:xfrm>
+            <a:off x="7448783" y="1943098"/>
+            <a:ext cx="914398" cy="914398"/>
+          </a:xfrm>
+          <a:prstGeom prst="rect">
+            <a:avLst/>
+          </a:prstGeom>
+        </p:spPr>
+      </p:pic>
+      <p:pic>
+        <p:nvPicPr>
+          <p:cNvPr id="17" name="Ábra 16" descr="Radír egyszínű kitöltéssel">
+            <a:extLst>
+              <a:ext uri="{FF2B5EF4-FFF2-40B4-BE49-F238E27FC236}">
+                <a16:creationId xmlns:a16="http://schemas.microsoft.com/office/drawing/2014/main" id="{C59A3CE7-0DE4-C7AB-B4A7-39EBE1F8FBDF}"/>
+              </a:ext>
+            </a:extLst>
+          </p:cNvPr>
+          <p:cNvPicPr>
+            <a:picLocks noChangeAspect="1"/>
+          </p:cNvPicPr>
+          <p:nvPr/>
+        </p:nvPicPr>
+        <p:blipFill>
+          <a:blip r:embed="rId18">
+            <a:extLst>
+              <a:ext uri="{96DAC541-7B7A-43D3-8B79-37D633B846F1}">
+                <asvg:svgBlip xmlns:asvg="http://schemas.microsoft.com/office/drawing/2016/SVG/main" r:embed="rId19"/>
+              </a:ext>
+            </a:extLst>
+          </a:blip>
+          <a:stretch>
+            <a:fillRect/>
+          </a:stretch>
+        </p:blipFill>
+        <p:spPr>
+          <a:xfrm>
+            <a:off x="6494656" y="1943098"/>
+            <a:ext cx="914398" cy="914398"/>
+          </a:xfrm>
+          <a:prstGeom prst="rect">
+            <a:avLst/>
+          </a:prstGeom>
+        </p:spPr>
+      </p:pic>
+      <p:pic>
+        <p:nvPicPr>
+          <p:cNvPr id="18" name="Ábra 17" descr="Nyolcas biliárdgolyó egyszínű kitöltéssel">
+            <a:extLst>
+              <a:ext uri="{FF2B5EF4-FFF2-40B4-BE49-F238E27FC236}">
+                <a16:creationId xmlns:a16="http://schemas.microsoft.com/office/drawing/2014/main" id="{5869CA73-68AA-A33D-F7B3-27F91A2D419A}"/>
+              </a:ext>
+            </a:extLst>
+          </p:cNvPr>
+          <p:cNvPicPr>
+            <a:picLocks noChangeAspect="1"/>
+          </p:cNvPicPr>
+          <p:nvPr/>
+        </p:nvPicPr>
+        <p:blipFill>
+          <a:blip r:embed="rId20">
+            <a:extLst>
+              <a:ext uri="{96DAC541-7B7A-43D3-8B79-37D633B846F1}">
+                <asvg:svgBlip xmlns:asvg="http://schemas.microsoft.com/office/drawing/2016/SVG/main" r:embed="rId21"/>
+              </a:ext>
+            </a:extLst>
+          </a:blip>
+          <a:stretch>
+            <a:fillRect/>
+          </a:stretch>
+        </p:blipFill>
+        <p:spPr>
+          <a:xfrm>
+            <a:off x="8402907" y="1943098"/>
+            <a:ext cx="914398" cy="914398"/>
+          </a:xfrm>
+          <a:prstGeom prst="rect">
+            <a:avLst/>
+          </a:prstGeom>
+        </p:spPr>
+      </p:pic>
+      <p:pic>
+        <p:nvPicPr>
+          <p:cNvPr id="19" name="Ábra 18" descr="Nyolcas biliárdgolyó egyszínű kitöltéssel">
+            <a:extLst>
+              <a:ext uri="{FF2B5EF4-FFF2-40B4-BE49-F238E27FC236}">
+                <a16:creationId xmlns:a16="http://schemas.microsoft.com/office/drawing/2014/main" id="{89FCD6EC-01B7-9E08-2DE7-EA70BAD001C8}"/>
+              </a:ext>
+            </a:extLst>
+          </p:cNvPr>
+          <p:cNvPicPr>
+            <a:picLocks noChangeAspect="1"/>
+          </p:cNvPicPr>
+          <p:nvPr/>
+        </p:nvPicPr>
+        <p:blipFill>
+          <a:blip r:embed="rId22">
+            <a:extLst>
+              <a:ext uri="{96DAC541-7B7A-43D3-8B79-37D633B846F1}">
+                <asvg:svgBlip xmlns:asvg="http://schemas.microsoft.com/office/drawing/2016/SVG/main" r:embed="rId23"/>
+              </a:ext>
+            </a:extLst>
+          </a:blip>
+          <a:stretch>
+            <a:fillRect/>
+          </a:stretch>
+        </p:blipFill>
+        <p:spPr>
+          <a:xfrm>
+            <a:off x="9350987" y="1943098"/>
+            <a:ext cx="914398" cy="914398"/>
+          </a:xfrm>
+          <a:prstGeom prst="rect">
+            <a:avLst/>
+          </a:prstGeom>
+        </p:spPr>
+      </p:pic>
+      <p:pic>
+        <p:nvPicPr>
+          <p:cNvPr id="20" name="Ábra 19" descr="A dolgok internete egyszínű kitöltéssel">
+            <a:extLst>
+              <a:ext uri="{FF2B5EF4-FFF2-40B4-BE49-F238E27FC236}">
+                <a16:creationId xmlns:a16="http://schemas.microsoft.com/office/drawing/2014/main" id="{2C154F0B-62D9-00DB-E0DE-6E46648AD9AB}"/>
+              </a:ext>
+            </a:extLst>
+          </p:cNvPr>
+          <p:cNvPicPr>
+            <a:picLocks noChangeAspect="1"/>
+          </p:cNvPicPr>
+          <p:nvPr/>
+        </p:nvPicPr>
+        <p:blipFill>
+          <a:blip r:embed="rId24">
+            <a:extLst>
+              <a:ext uri="{96DAC541-7B7A-43D3-8B79-37D633B846F1}">
+                <asvg:svgBlip xmlns:asvg="http://schemas.microsoft.com/office/drawing/2016/SVG/main" r:embed="rId25"/>
+              </a:ext>
+            </a:extLst>
+          </a:blip>
+          <a:stretch>
+            <a:fillRect/>
+          </a:stretch>
+        </p:blipFill>
+        <p:spPr>
+          <a:xfrm>
+            <a:off x="809625" y="3005847"/>
+            <a:ext cx="914398" cy="914398"/>
+          </a:xfrm>
+          <a:prstGeom prst="rect">
+            <a:avLst/>
+          </a:prstGeom>
+        </p:spPr>
+      </p:pic>
+      <p:pic>
+        <p:nvPicPr>
+          <p:cNvPr id="21" name="Ábra 20" descr="A dolgok internete egyszínű kitöltéssel">
+            <a:extLst>
+              <a:ext uri="{FF2B5EF4-FFF2-40B4-BE49-F238E27FC236}">
+                <a16:creationId xmlns:a16="http://schemas.microsoft.com/office/drawing/2014/main" id="{C7CC9EA9-2699-06CA-4865-53EC3B1C4BAC}"/>
+              </a:ext>
+            </a:extLst>
+          </p:cNvPr>
+          <p:cNvPicPr>
+            <a:picLocks noChangeAspect="1"/>
+          </p:cNvPicPr>
+          <p:nvPr/>
+        </p:nvPicPr>
+        <p:blipFill>
+          <a:blip r:embed="rId26">
+            <a:extLst>
+              <a:ext uri="{96DAC541-7B7A-43D3-8B79-37D633B846F1}">
+                <asvg:svgBlip xmlns:asvg="http://schemas.microsoft.com/office/drawing/2016/SVG/main" r:embed="rId27"/>
+              </a:ext>
+            </a:extLst>
+          </a:blip>
+          <a:stretch>
+            <a:fillRect/>
+          </a:stretch>
+        </p:blipFill>
+        <p:spPr>
+          <a:xfrm>
+            <a:off x="1763754" y="3005847"/>
+            <a:ext cx="914398" cy="914398"/>
+          </a:xfrm>
+          <a:prstGeom prst="rect">
+            <a:avLst/>
+          </a:prstGeom>
+        </p:spPr>
+      </p:pic>
+      <p:pic>
+        <p:nvPicPr>
+          <p:cNvPr id="22" name="Ábra 21" descr="Vonalas nyíl: egyenes egyszínű kitöltéssel">
+            <a:extLst>
+              <a:ext uri="{FF2B5EF4-FFF2-40B4-BE49-F238E27FC236}">
+                <a16:creationId xmlns:a16="http://schemas.microsoft.com/office/drawing/2014/main" id="{5C53DB67-5D89-6E41-3C4F-1E0AECABCB63}"/>
+              </a:ext>
+            </a:extLst>
+          </p:cNvPr>
+          <p:cNvPicPr>
+            <a:picLocks noChangeAspect="1"/>
+          </p:cNvPicPr>
+          <p:nvPr/>
+        </p:nvPicPr>
+        <p:blipFill>
+          <a:blip r:embed="rId28">
+            <a:extLst>
+              <a:ext uri="{96DAC541-7B7A-43D3-8B79-37D633B846F1}">
+                <asvg:svgBlip xmlns:asvg="http://schemas.microsoft.com/office/drawing/2016/SVG/main" r:embed="rId29"/>
+              </a:ext>
+            </a:extLst>
+          </a:blip>
+          <a:stretch>
+            <a:fillRect/>
+          </a:stretch>
+        </p:blipFill>
+        <p:spPr>
+          <a:xfrm rot="10800000">
+            <a:off x="2678152" y="3005847"/>
+            <a:ext cx="914398" cy="914398"/>
+          </a:xfrm>
+          <a:prstGeom prst="rect">
+            <a:avLst/>
+          </a:prstGeom>
+        </p:spPr>
+      </p:pic>
+      <p:pic>
+        <p:nvPicPr>
+          <p:cNvPr id="23" name="Ábra 22" descr="Vonalas nyíl: egyenes egyszínű kitöltéssel">
+            <a:extLst>
+              <a:ext uri="{FF2B5EF4-FFF2-40B4-BE49-F238E27FC236}">
+                <a16:creationId xmlns:a16="http://schemas.microsoft.com/office/drawing/2014/main" id="{D96AD2F2-791C-D68D-9FD1-181926EDDC67}"/>
+              </a:ext>
+            </a:extLst>
+          </p:cNvPr>
+          <p:cNvPicPr>
+            <a:picLocks noChangeAspect="1"/>
+          </p:cNvPicPr>
+          <p:nvPr/>
+        </p:nvPicPr>
+        <p:blipFill>
+          <a:blip r:embed="rId30">
+            <a:extLst>
+              <a:ext uri="{96DAC541-7B7A-43D3-8B79-37D633B846F1}">
+                <asvg:svgBlip xmlns:asvg="http://schemas.microsoft.com/office/drawing/2016/SVG/main" r:embed="rId31"/>
+              </a:ext>
+            </a:extLst>
+          </a:blip>
+          <a:stretch>
+            <a:fillRect/>
+          </a:stretch>
+        </p:blipFill>
+        <p:spPr>
+          <a:xfrm rot="10800000">
+            <a:off x="3632278" y="3005847"/>
+            <a:ext cx="914398" cy="914398"/>
+          </a:xfrm>
+          <a:prstGeom prst="rect">
+            <a:avLst/>
+          </a:prstGeom>
+        </p:spPr>
+      </p:pic>
+      <p:pic>
+        <p:nvPicPr>
+          <p:cNvPr id="24" name="Ábra 23" descr="Három vonal ikon egyszínű kitöltéssel">
+            <a:extLst>
+              <a:ext uri="{FF2B5EF4-FFF2-40B4-BE49-F238E27FC236}">
+                <a16:creationId xmlns:a16="http://schemas.microsoft.com/office/drawing/2014/main" id="{4463DEFA-D887-55FC-60C4-767350E83BF5}"/>
+              </a:ext>
+            </a:extLst>
+          </p:cNvPr>
+          <p:cNvPicPr>
+            <a:picLocks noChangeAspect="1"/>
+          </p:cNvPicPr>
+          <p:nvPr/>
+        </p:nvPicPr>
+        <p:blipFill>
+          <a:blip r:embed="rId32">
+            <a:extLst>
+              <a:ext uri="{96DAC541-7B7A-43D3-8B79-37D633B846F1}">
+                <asvg:svgBlip xmlns:asvg="http://schemas.microsoft.com/office/drawing/2016/SVG/main" r:embed="rId33"/>
+              </a:ext>
+            </a:extLst>
+          </a:blip>
+          <a:stretch>
+            <a:fillRect/>
+          </a:stretch>
+        </p:blipFill>
+        <p:spPr>
+          <a:xfrm>
+            <a:off x="4586403" y="3005844"/>
+            <a:ext cx="954127" cy="954127"/>
+          </a:xfrm>
+          <a:prstGeom prst="rect">
+            <a:avLst/>
+          </a:prstGeom>
+        </p:spPr>
+      </p:pic>
+      <p:pic>
+        <p:nvPicPr>
+          <p:cNvPr id="25" name="Ábra 24" descr="Három vonal ikon egyszínű kitöltéssel">
+            <a:extLst>
+              <a:ext uri="{FF2B5EF4-FFF2-40B4-BE49-F238E27FC236}">
+                <a16:creationId xmlns:a16="http://schemas.microsoft.com/office/drawing/2014/main" id="{3E785047-A914-3B78-480B-60EA315EFBB2}"/>
+              </a:ext>
+            </a:extLst>
+          </p:cNvPr>
+          <p:cNvPicPr>
+            <a:picLocks noChangeAspect="1"/>
+          </p:cNvPicPr>
+          <p:nvPr/>
+        </p:nvPicPr>
+        <p:blipFill>
+          <a:blip r:embed="rId34">
+            <a:extLst>
+              <a:ext uri="{96DAC541-7B7A-43D3-8B79-37D633B846F1}">
+                <asvg:svgBlip xmlns:asvg="http://schemas.microsoft.com/office/drawing/2016/SVG/main" r:embed="rId35"/>
+              </a:ext>
+            </a:extLst>
+          </a:blip>
+          <a:stretch>
+            <a:fillRect/>
+          </a:stretch>
+        </p:blipFill>
+        <p:spPr>
+          <a:xfrm>
+            <a:off x="5500800" y="3007258"/>
+            <a:ext cx="954127" cy="954127"/>
+          </a:xfrm>
+          <a:prstGeom prst="rect">
+            <a:avLst/>
+          </a:prstGeom>
+        </p:spPr>
+      </p:pic>
+    </p:spTree>
+    <p:extLst>
+      <p:ext uri="{BB962C8B-B14F-4D97-AF65-F5344CB8AC3E}">
+        <p14:creationId xmlns:p14="http://schemas.microsoft.com/office/powerpoint/2010/main" val="2002351458"/>
+      </p:ext>
+    </p:extLst>
+  </p:cSld>
+  <p:clrMapOvr>
+    <a:masterClrMapping/>
+  </p:clrMapOvr>
+</p:sld>
+</file>
+
+<file path=ppt/slides/slide7.xml><?xml version="1.0" encoding="utf-8"?>
 <p:sld xmlns:a="http://schemas.openxmlformats.org/drawingml/2006/main" xmlns:r="http://schemas.openxmlformats.org/officeDocument/2006/relationships" xmlns:p="http://schemas.openxmlformats.org/presentationml/2006/main">
   <p:cSld>
     <p:bg>
@@ -9267,13 +9942,13 @@
   <p:clrMapOvr>
     <a:masterClrMapping/>
   </p:clrMapOvr>
-  <mc:AlternateContent xmlns:mc="http://schemas.openxmlformats.org/markup-compatibility/2006">
-    <mc:Choice xmlns:p14="http://schemas.microsoft.com/office/powerpoint/2010/main" Requires="p14">
+  <mc:AlternateContent xmlns:mc="http://schemas.openxmlformats.org/markup-compatibility/2006" xmlns:p14="http://schemas.microsoft.com/office/powerpoint/2010/main">
+    <mc:Choice Requires="p14">
       <p:transition spd="slow" p14:dur="3900">
         <p14:glitter pattern="hexagon"/>
       </p:transition>
     </mc:Choice>
-    <mc:Fallback>
+    <mc:Fallback xmlns="">
       <p:transition spd="slow">
         <p:fade/>
       </p:transition>

</xml_diff>